<commit_message>
Index bonito añadido en documentacion/index.html
</commit_message>
<xml_diff>
--- a/documentacion/Taller de AngularJS.pptx
+++ b/documentacion/Taller de AngularJS.pptx
@@ -47,6 +47,7 @@
     <p:sldId id="296" r:id="rId41"/>
     <p:sldId id="297" r:id="rId42"/>
     <p:sldId id="298" r:id="rId43"/>
+    <p:sldId id="300" r:id="rId44"/>
   </p:sldIdLst>
   <p:sldSz cx="9144000" cy="6858000" type="screen4x3"/>
   <p:notesSz cx="6858000" cy="9144000"/>
@@ -145,6 +146,11 @@
       </a:defRPr>
     </a:lvl9pPr>
   </p:defaultTextStyle>
+  <p:extLst>
+    <p:ext uri="{EFAFB233-063F-42B5-8137-9DF3F51BA10A}">
+      <p15:sldGuideLst xmlns:p15="http://schemas.microsoft.com/office/powerpoint/2012/main"/>
+    </p:ext>
+  </p:extLst>
 </p:presentation>
 </file>
 
@@ -279,7 +285,7 @@
           <a:p>
             <a:fld id="{E1C7E796-22A4-41E2-9851-5EFB902E6F14}" type="datetimeFigureOut">
               <a:rPr lang="es-ES" smtClean="0"/>
-              <a:t>06/02/2017</a:t>
+              <a:t>07/02/2017</a:t>
             </a:fld>
             <a:endParaRPr lang="es-ES"/>
           </a:p>
@@ -449,7 +455,7 @@
           <a:p>
             <a:fld id="{E1C7E796-22A4-41E2-9851-5EFB902E6F14}" type="datetimeFigureOut">
               <a:rPr lang="es-ES" smtClean="0"/>
-              <a:t>06/02/2017</a:t>
+              <a:t>07/02/2017</a:t>
             </a:fld>
             <a:endParaRPr lang="es-ES"/>
           </a:p>
@@ -629,7 +635,7 @@
           <a:p>
             <a:fld id="{E1C7E796-22A4-41E2-9851-5EFB902E6F14}" type="datetimeFigureOut">
               <a:rPr lang="es-ES" smtClean="0"/>
-              <a:t>06/02/2017</a:t>
+              <a:t>07/02/2017</a:t>
             </a:fld>
             <a:endParaRPr lang="es-ES"/>
           </a:p>
@@ -799,7 +805,7 @@
           <a:p>
             <a:fld id="{E1C7E796-22A4-41E2-9851-5EFB902E6F14}" type="datetimeFigureOut">
               <a:rPr lang="es-ES" smtClean="0"/>
-              <a:t>06/02/2017</a:t>
+              <a:t>07/02/2017</a:t>
             </a:fld>
             <a:endParaRPr lang="es-ES"/>
           </a:p>
@@ -1043,7 +1049,7 @@
           <a:p>
             <a:fld id="{E1C7E796-22A4-41E2-9851-5EFB902E6F14}" type="datetimeFigureOut">
               <a:rPr lang="es-ES" smtClean="0"/>
-              <a:t>06/02/2017</a:t>
+              <a:t>07/02/2017</a:t>
             </a:fld>
             <a:endParaRPr lang="es-ES"/>
           </a:p>
@@ -1275,7 +1281,7 @@
           <a:p>
             <a:fld id="{E1C7E796-22A4-41E2-9851-5EFB902E6F14}" type="datetimeFigureOut">
               <a:rPr lang="es-ES" smtClean="0"/>
-              <a:t>06/02/2017</a:t>
+              <a:t>07/02/2017</a:t>
             </a:fld>
             <a:endParaRPr lang="es-ES"/>
           </a:p>
@@ -1642,7 +1648,7 @@
           <a:p>
             <a:fld id="{E1C7E796-22A4-41E2-9851-5EFB902E6F14}" type="datetimeFigureOut">
               <a:rPr lang="es-ES" smtClean="0"/>
-              <a:t>06/02/2017</a:t>
+              <a:t>07/02/2017</a:t>
             </a:fld>
             <a:endParaRPr lang="es-ES"/>
           </a:p>
@@ -1760,7 +1766,7 @@
           <a:p>
             <a:fld id="{E1C7E796-22A4-41E2-9851-5EFB902E6F14}" type="datetimeFigureOut">
               <a:rPr lang="es-ES" smtClean="0"/>
-              <a:t>06/02/2017</a:t>
+              <a:t>07/02/2017</a:t>
             </a:fld>
             <a:endParaRPr lang="es-ES"/>
           </a:p>
@@ -1855,7 +1861,7 @@
           <a:p>
             <a:fld id="{E1C7E796-22A4-41E2-9851-5EFB902E6F14}" type="datetimeFigureOut">
               <a:rPr lang="es-ES" smtClean="0"/>
-              <a:t>06/02/2017</a:t>
+              <a:t>07/02/2017</a:t>
             </a:fld>
             <a:endParaRPr lang="es-ES"/>
           </a:p>
@@ -2132,7 +2138,7 @@
           <a:p>
             <a:fld id="{E1C7E796-22A4-41E2-9851-5EFB902E6F14}" type="datetimeFigureOut">
               <a:rPr lang="es-ES" smtClean="0"/>
-              <a:t>06/02/2017</a:t>
+              <a:t>07/02/2017</a:t>
             </a:fld>
             <a:endParaRPr lang="es-ES"/>
           </a:p>
@@ -2389,7 +2395,7 @@
           <a:p>
             <a:fld id="{E1C7E796-22A4-41E2-9851-5EFB902E6F14}" type="datetimeFigureOut">
               <a:rPr lang="es-ES" smtClean="0"/>
-              <a:t>06/02/2017</a:t>
+              <a:t>07/02/2017</a:t>
             </a:fld>
             <a:endParaRPr lang="es-ES"/>
           </a:p>
@@ -2602,7 +2608,7 @@
           <a:p>
             <a:fld id="{E1C7E796-22A4-41E2-9851-5EFB902E6F14}" type="datetimeFigureOut">
               <a:rPr lang="es-ES" smtClean="0"/>
-              <a:t>06/02/2017</a:t>
+              <a:t>07/02/2017</a:t>
             </a:fld>
             <a:endParaRPr lang="es-ES"/>
           </a:p>
@@ -13865,14 +13871,6 @@
               </a:rPr>
               <a:t>&gt;&lt;/script&gt;</a:t>
             </a:r>
-            <a:endParaRPr lang="es-ES" sz="1400" b="0" dirty="0" smtClean="0">
-              <a:solidFill>
-                <a:srgbClr val="0000FF"/>
-              </a:solidFill>
-              <a:highlight>
-                <a:srgbClr val="FFFFFF"/>
-              </a:highlight>
-            </a:endParaRPr>
           </a:p>
           <a:p>
             <a:r>
@@ -23143,14 +23141,6 @@
               </a:rPr>
               <a:t> = “0”;</a:t>
             </a:r>
-            <a:endParaRPr lang="es-ES" sz="1400" b="0" dirty="0" smtClean="0">
-              <a:solidFill>
-                <a:srgbClr val="000000"/>
-              </a:solidFill>
-              <a:highlight>
-                <a:srgbClr val="FFFFFF"/>
-              </a:highlight>
-            </a:endParaRPr>
           </a:p>
           <a:p>
             <a:pPr defTabSz="180000"/>
@@ -25259,18 +25249,7 @@
                   <a:srgbClr val="FFFFFF"/>
                 </a:highlight>
               </a:rPr>
-              <a:t>”</a:t>
-            </a:r>
-            <a:r>
-              <a:rPr lang="es-ES" sz="1400" b="0" dirty="0" smtClean="0">
-                <a:solidFill>
-                  <a:srgbClr val="FF8000"/>
-                </a:solidFill>
-                <a:highlight>
-                  <a:srgbClr val="FFFFFF"/>
-                </a:highlight>
-              </a:rPr>
-              <a:t>0”</a:t>
+              <a:t>”0”</a:t>
             </a:r>
             <a:r>
               <a:rPr lang="es-ES" sz="1400" b="1" dirty="0" smtClean="0">
@@ -31507,18 +31486,7 @@
                   <a:srgbClr val="FFFFFF"/>
                 </a:highlight>
               </a:rPr>
-              <a:t>&gt; </a:t>
-            </a:r>
-            <a:r>
-              <a:rPr lang="es-ES" sz="1400" b="0" dirty="0" smtClean="0">
-                <a:solidFill>
-                  <a:srgbClr val="0000FF"/>
-                </a:solidFill>
-                <a:highlight>
-                  <a:srgbClr val="FFFFFF"/>
-                </a:highlight>
-              </a:rPr>
-              <a:t>&gt;</a:t>
+              <a:t>&gt; &gt;</a:t>
             </a:r>
             <a:r>
               <a:rPr lang="es-ES" sz="1400" b="1" dirty="0" smtClean="0">
@@ -34412,6 +34380,187 @@
     <p:extLst>
       <p:ext uri="{BB962C8B-B14F-4D97-AF65-F5344CB8AC3E}">
         <p14:creationId xmlns:p14="http://schemas.microsoft.com/office/powerpoint/2010/main" val="3220762716"/>
+      </p:ext>
+    </p:extLst>
+  </p:cSld>
+  <p:clrMapOvr>
+    <a:masterClrMapping/>
+  </p:clrMapOvr>
+  <p:timing>
+    <p:tnLst>
+      <p:par>
+        <p:cTn id="1" dur="indefinite" restart="never" nodeType="tmRoot"/>
+      </p:par>
+    </p:tnLst>
+  </p:timing>
+</p:sld>
+</file>
+
+<file path=ppt/slides/slide43.xml><?xml version="1.0" encoding="utf-8"?>
+<p:sld xmlns:a="http://schemas.openxmlformats.org/drawingml/2006/main" xmlns:r="http://schemas.openxmlformats.org/officeDocument/2006/relationships" xmlns:p="http://schemas.openxmlformats.org/presentationml/2006/main">
+  <p:cSld>
+    <p:spTree>
+      <p:nvGrpSpPr>
+        <p:cNvPr id="1" name=""/>
+        <p:cNvGrpSpPr/>
+        <p:nvPr/>
+      </p:nvGrpSpPr>
+      <p:grpSpPr>
+        <a:xfrm>
+          <a:off x="0" y="0"/>
+          <a:ext cx="0" cy="0"/>
+          <a:chOff x="0" y="0"/>
+          <a:chExt cx="0" cy="0"/>
+        </a:xfrm>
+      </p:grpSpPr>
+      <p:sp>
+        <p:nvSpPr>
+          <p:cNvPr id="4" name="Título 3"/>
+          <p:cNvSpPr>
+            <a:spLocks noGrp="1"/>
+          </p:cNvSpPr>
+          <p:nvPr>
+            <p:ph type="title"/>
+          </p:nvPr>
+        </p:nvSpPr>
+        <p:spPr>
+          <a:xfrm>
+            <a:off x="628650" y="365126"/>
+            <a:ext cx="7886700" cy="695923"/>
+          </a:xfrm>
+        </p:spPr>
+        <p:txBody>
+          <a:bodyPr/>
+          <a:lstStyle/>
+          <a:p>
+            <a:r>
+              <a:rPr lang="es-ES" dirty="0" smtClean="0"/>
+              <a:t>Taller</a:t>
+            </a:r>
+            <a:endParaRPr lang="es-ES" dirty="0"/>
+          </a:p>
+        </p:txBody>
+      </p:sp>
+      <p:sp>
+        <p:nvSpPr>
+          <p:cNvPr id="6" name="Rectángulo 5"/>
+          <p:cNvSpPr/>
+          <p:nvPr/>
+        </p:nvSpPr>
+        <p:spPr>
+          <a:xfrm rot="5400000">
+            <a:off x="4418881" y="1838865"/>
+            <a:ext cx="306238" cy="9144000"/>
+          </a:xfrm>
+          <a:prstGeom prst="rect">
+            <a:avLst/>
+          </a:prstGeom>
+          <a:solidFill>
+            <a:schemeClr val="accent4">
+              <a:lumMod val="40000"/>
+              <a:lumOff val="60000"/>
+            </a:schemeClr>
+          </a:solidFill>
+          <a:ln w="28575">
+            <a:solidFill>
+              <a:schemeClr val="accent6">
+                <a:lumMod val="40000"/>
+                <a:lumOff val="60000"/>
+              </a:schemeClr>
+            </a:solidFill>
+          </a:ln>
+        </p:spPr>
+        <p:style>
+          <a:lnRef idx="2">
+            <a:schemeClr val="accent1">
+              <a:shade val="50000"/>
+            </a:schemeClr>
+          </a:lnRef>
+          <a:fillRef idx="1">
+            <a:schemeClr val="accent1"/>
+          </a:fillRef>
+          <a:effectRef idx="0">
+            <a:schemeClr val="accent1"/>
+          </a:effectRef>
+          <a:fontRef idx="minor">
+            <a:schemeClr val="lt1"/>
+          </a:fontRef>
+        </p:style>
+        <p:txBody>
+          <a:bodyPr rtlCol="0" anchor="ctr"/>
+          <a:lstStyle/>
+          <a:p>
+            <a:pPr algn="ctr"/>
+            <a:endParaRPr lang="es-ES"/>
+          </a:p>
+        </p:txBody>
+      </p:sp>
+      <p:sp>
+        <p:nvSpPr>
+          <p:cNvPr id="7" name="CuadroTexto 6"/>
+          <p:cNvSpPr txBox="1"/>
+          <p:nvPr/>
+        </p:nvSpPr>
+        <p:spPr>
+          <a:xfrm>
+            <a:off x="628650" y="1166070"/>
+            <a:ext cx="7827453" cy="646331"/>
+          </a:xfrm>
+          <a:prstGeom prst="rect">
+            <a:avLst/>
+          </a:prstGeom>
+          <a:noFill/>
+        </p:spPr>
+        <p:txBody>
+          <a:bodyPr wrap="square" rtlCol="0">
+            <a:spAutoFit/>
+          </a:bodyPr>
+          <a:lstStyle/>
+          <a:p>
+            <a:r>
+              <a:rPr lang="es-ES" dirty="0" smtClean="0"/>
+              <a:t>A ponerlo bonito (https</a:t>
+            </a:r>
+            <a:r>
+              <a:rPr lang="es-ES" dirty="0"/>
+              <a:t>://</a:t>
+            </a:r>
+            <a:r>
+              <a:rPr lang="es-ES" dirty="0" smtClean="0"/>
+              <a:t>github.com/MarcosGinel/rss/blob/master/documentacion/index.html</a:t>
+            </a:r>
+            <a:endParaRPr lang="es-ES" dirty="0"/>
+          </a:p>
+        </p:txBody>
+      </p:sp>
+      <p:pic>
+        <p:nvPicPr>
+          <p:cNvPr id="3" name="Imagen 2"/>
+          <p:cNvPicPr>
+            <a:picLocks noChangeAspect="1"/>
+          </p:cNvPicPr>
+          <p:nvPr/>
+        </p:nvPicPr>
+        <p:blipFill>
+          <a:blip r:embed="rId2"/>
+          <a:stretch>
+            <a:fillRect/>
+          </a:stretch>
+        </p:blipFill>
+        <p:spPr>
+          <a:xfrm>
+            <a:off x="1325197" y="1904906"/>
+            <a:ext cx="6434358" cy="4260334"/>
+          </a:xfrm>
+          <a:prstGeom prst="rect">
+            <a:avLst/>
+          </a:prstGeom>
+        </p:spPr>
+      </p:pic>
+    </p:spTree>
+    <p:extLst>
+      <p:ext uri="{BB962C8B-B14F-4D97-AF65-F5344CB8AC3E}">
+        <p14:creationId xmlns:p14="http://schemas.microsoft.com/office/powerpoint/2010/main" val="408789392"/>
       </p:ext>
     </p:extLst>
   </p:cSld>

</xml_diff>

<commit_message>
Prueba de superdirectiva no añadida
</commit_message>
<xml_diff>
--- a/documentacion/Taller de AngularJS.pptx
+++ b/documentacion/Taller de AngularJS.pptx
@@ -64,6 +64,8 @@
     <p:sldId id="314" r:id="rId58"/>
     <p:sldId id="315" r:id="rId59"/>
     <p:sldId id="316" r:id="rId60"/>
+    <p:sldId id="317" r:id="rId61"/>
+    <p:sldId id="318" r:id="rId62"/>
   </p:sldIdLst>
   <p:sldSz cx="9144000" cy="6858000" type="screen4x3"/>
   <p:notesSz cx="6858000" cy="9144000"/>
@@ -7413,7 +7415,35 @@
           <a:bodyPr/>
           <a:lstStyle/>
           <a:p>
-            <a:endParaRPr lang="es-ES"/>
+            <a:r>
+              <a:rPr lang="es-ES" dirty="0" smtClean="0"/>
+              <a:t>¿Quién eres?</a:t>
+            </a:r>
+          </a:p>
+          <a:p>
+            <a:r>
+              <a:rPr lang="es-ES" dirty="0" smtClean="0"/>
+              <a:t>¿Por qué?</a:t>
+            </a:r>
+          </a:p>
+          <a:p>
+            <a:r>
+              <a:rPr lang="es-ES" dirty="0" smtClean="0"/>
+              <a:t>¿Y después?</a:t>
+            </a:r>
+          </a:p>
+          <a:p>
+            <a:r>
+              <a:rPr lang="es-ES" dirty="0" smtClean="0"/>
+              <a:t>Teoría</a:t>
+            </a:r>
+          </a:p>
+          <a:p>
+            <a:r>
+              <a:rPr lang="es-ES" dirty="0" smtClean="0"/>
+              <a:t>Taller</a:t>
+            </a:r>
+            <a:endParaRPr lang="es-ES" dirty="0"/>
           </a:p>
         </p:txBody>
       </p:sp>
@@ -48547,14 +48577,6 @@
               </a:rPr>
               <a:t>&gt;</a:t>
             </a:r>
-            <a:endParaRPr lang="es-ES" sz="1400" dirty="0">
-              <a:solidFill>
-                <a:srgbClr val="0000FF"/>
-              </a:solidFill>
-              <a:highlight>
-                <a:srgbClr val="FFFFFF"/>
-              </a:highlight>
-            </a:endParaRPr>
           </a:p>
         </p:txBody>
       </p:sp>
@@ -50078,14 +50100,6 @@
               </a:rPr>
               <a:t>&gt;</a:t>
             </a:r>
-            <a:endParaRPr lang="es-ES" sz="1400" dirty="0">
-              <a:solidFill>
-                <a:srgbClr val="0000FF"/>
-              </a:solidFill>
-              <a:highlight>
-                <a:srgbClr val="FFFFFF"/>
-              </a:highlight>
-            </a:endParaRPr>
           </a:p>
         </p:txBody>
       </p:sp>
@@ -51006,11 +51020,6 @@
               </a:rPr>
               <a:t>¿Dónde están los datos ahora mismo?</a:t>
             </a:r>
-            <a:endParaRPr lang="es-ES" dirty="0" smtClean="0">
-              <a:solidFill>
-                <a:schemeClr val="tx1"/>
-              </a:solidFill>
-            </a:endParaRPr>
           </a:p>
           <a:p>
             <a:pPr algn="ctr"/>
@@ -52945,6 +52954,1055 @@
     <p:extLst>
       <p:ext uri="{BB962C8B-B14F-4D97-AF65-F5344CB8AC3E}">
         <p14:creationId xmlns:p14="http://schemas.microsoft.com/office/powerpoint/2010/main" val="418756768"/>
+      </p:ext>
+    </p:extLst>
+  </p:cSld>
+  <p:clrMapOvr>
+    <a:masterClrMapping/>
+  </p:clrMapOvr>
+  <p:timing>
+    <p:tnLst>
+      <p:par>
+        <p:cTn id="1" dur="indefinite" restart="never" nodeType="tmRoot"/>
+      </p:par>
+    </p:tnLst>
+  </p:timing>
+</p:sld>
+</file>
+
+<file path=ppt/slides/slide60.xml><?xml version="1.0" encoding="utf-8"?>
+<p:sld xmlns:a="http://schemas.openxmlformats.org/drawingml/2006/main" xmlns:r="http://schemas.openxmlformats.org/officeDocument/2006/relationships" xmlns:p="http://schemas.openxmlformats.org/presentationml/2006/main">
+  <p:cSld>
+    <p:spTree>
+      <p:nvGrpSpPr>
+        <p:cNvPr id="1" name=""/>
+        <p:cNvGrpSpPr/>
+        <p:nvPr/>
+      </p:nvGrpSpPr>
+      <p:grpSpPr>
+        <a:xfrm>
+          <a:off x="0" y="0"/>
+          <a:ext cx="0" cy="0"/>
+          <a:chOff x="0" y="0"/>
+          <a:chExt cx="0" cy="0"/>
+        </a:xfrm>
+      </p:grpSpPr>
+      <p:sp>
+        <p:nvSpPr>
+          <p:cNvPr id="4" name="Título 3"/>
+          <p:cNvSpPr>
+            <a:spLocks noGrp="1"/>
+          </p:cNvSpPr>
+          <p:nvPr>
+            <p:ph type="title"/>
+          </p:nvPr>
+        </p:nvSpPr>
+        <p:spPr>
+          <a:xfrm>
+            <a:off x="628650" y="365126"/>
+            <a:ext cx="7886700" cy="695923"/>
+          </a:xfrm>
+        </p:spPr>
+        <p:txBody>
+          <a:bodyPr/>
+          <a:lstStyle/>
+          <a:p>
+            <a:r>
+              <a:rPr lang="es-ES" dirty="0" smtClean="0"/>
+              <a:t>Taller</a:t>
+            </a:r>
+            <a:endParaRPr lang="es-ES" dirty="0"/>
+          </a:p>
+        </p:txBody>
+      </p:sp>
+      <p:sp>
+        <p:nvSpPr>
+          <p:cNvPr id="6" name="Rectángulo 5"/>
+          <p:cNvSpPr/>
+          <p:nvPr/>
+        </p:nvSpPr>
+        <p:spPr>
+          <a:xfrm rot="5400000">
+            <a:off x="4418881" y="1812986"/>
+            <a:ext cx="306238" cy="9144000"/>
+          </a:xfrm>
+          <a:prstGeom prst="rect">
+            <a:avLst/>
+          </a:prstGeom>
+          <a:solidFill>
+            <a:schemeClr val="accent4">
+              <a:lumMod val="40000"/>
+              <a:lumOff val="60000"/>
+            </a:schemeClr>
+          </a:solidFill>
+          <a:ln w="28575">
+            <a:solidFill>
+              <a:schemeClr val="accent6">
+                <a:lumMod val="40000"/>
+                <a:lumOff val="60000"/>
+              </a:schemeClr>
+            </a:solidFill>
+          </a:ln>
+        </p:spPr>
+        <p:style>
+          <a:lnRef idx="2">
+            <a:schemeClr val="accent1">
+              <a:shade val="50000"/>
+            </a:schemeClr>
+          </a:lnRef>
+          <a:fillRef idx="1">
+            <a:schemeClr val="accent1"/>
+          </a:fillRef>
+          <a:effectRef idx="0">
+            <a:schemeClr val="accent1"/>
+          </a:effectRef>
+          <a:fontRef idx="minor">
+            <a:schemeClr val="lt1"/>
+          </a:fontRef>
+        </p:style>
+        <p:txBody>
+          <a:bodyPr rtlCol="0" anchor="ctr"/>
+          <a:lstStyle/>
+          <a:p>
+            <a:pPr algn="ctr"/>
+            <a:endParaRPr lang="es-ES"/>
+          </a:p>
+        </p:txBody>
+      </p:sp>
+      <p:sp>
+        <p:nvSpPr>
+          <p:cNvPr id="2" name="Rectángulo 1"/>
+          <p:cNvSpPr/>
+          <p:nvPr/>
+        </p:nvSpPr>
+        <p:spPr>
+          <a:xfrm>
+            <a:off x="1017917" y="1132053"/>
+            <a:ext cx="7497433" cy="2031325"/>
+          </a:xfrm>
+          <a:prstGeom prst="rect">
+            <a:avLst/>
+          </a:prstGeom>
+          <a:solidFill>
+            <a:schemeClr val="bg1"/>
+          </a:solidFill>
+          <a:ln>
+            <a:solidFill>
+              <a:schemeClr val="accent6"/>
+            </a:solidFill>
+          </a:ln>
+        </p:spPr>
+        <p:txBody>
+          <a:bodyPr wrap="square">
+            <a:spAutoFit/>
+          </a:bodyPr>
+          <a:lstStyle/>
+          <a:p>
+            <a:r>
+              <a:rPr lang="es-ES" dirty="0" err="1">
+                <a:solidFill>
+                  <a:srgbClr val="000000"/>
+                </a:solidFill>
+                <a:highlight>
+                  <a:srgbClr val="FFFFFF"/>
+                </a:highlight>
+              </a:rPr>
+              <a:t>angular</a:t>
+            </a:r>
+            <a:r>
+              <a:rPr lang="es-ES" b="1" dirty="0" err="1">
+                <a:solidFill>
+                  <a:srgbClr val="000080"/>
+                </a:solidFill>
+                <a:highlight>
+                  <a:srgbClr val="FFFFFF"/>
+                </a:highlight>
+              </a:rPr>
+              <a:t>.</a:t>
+            </a:r>
+            <a:r>
+              <a:rPr lang="es-ES" dirty="0" err="1">
+                <a:solidFill>
+                  <a:srgbClr val="000000"/>
+                </a:solidFill>
+                <a:highlight>
+                  <a:srgbClr val="FFFFFF"/>
+                </a:highlight>
+              </a:rPr>
+              <a:t>module</a:t>
+            </a:r>
+            <a:r>
+              <a:rPr lang="es-ES" b="1" dirty="0">
+                <a:solidFill>
+                  <a:srgbClr val="000080"/>
+                </a:solidFill>
+                <a:highlight>
+                  <a:srgbClr val="FFFFFF"/>
+                </a:highlight>
+              </a:rPr>
+              <a:t>(</a:t>
+            </a:r>
+            <a:r>
+              <a:rPr lang="es-ES" dirty="0">
+                <a:solidFill>
+                  <a:srgbClr val="808080"/>
+                </a:solidFill>
+                <a:highlight>
+                  <a:srgbClr val="FFFFFF"/>
+                </a:highlight>
+              </a:rPr>
+              <a:t>"</a:t>
+            </a:r>
+            <a:r>
+              <a:rPr lang="es-ES" dirty="0" err="1">
+                <a:solidFill>
+                  <a:srgbClr val="808080"/>
+                </a:solidFill>
+                <a:highlight>
+                  <a:srgbClr val="FFFFFF"/>
+                </a:highlight>
+              </a:rPr>
+              <a:t>nuestroRSS</a:t>
+            </a:r>
+            <a:r>
+              <a:rPr lang="es-ES" dirty="0">
+                <a:solidFill>
+                  <a:srgbClr val="808080"/>
+                </a:solidFill>
+                <a:highlight>
+                  <a:srgbClr val="FFFFFF"/>
+                </a:highlight>
+              </a:rPr>
+              <a:t>"</a:t>
+            </a:r>
+            <a:r>
+              <a:rPr lang="es-ES" b="1" dirty="0">
+                <a:solidFill>
+                  <a:srgbClr val="000080"/>
+                </a:solidFill>
+                <a:highlight>
+                  <a:srgbClr val="FFFFFF"/>
+                </a:highlight>
+              </a:rPr>
+              <a:t>).</a:t>
+            </a:r>
+            <a:r>
+              <a:rPr lang="es-ES" dirty="0" err="1">
+                <a:solidFill>
+                  <a:srgbClr val="000000"/>
+                </a:solidFill>
+                <a:highlight>
+                  <a:srgbClr val="FFFFFF"/>
+                </a:highlight>
+              </a:rPr>
+              <a:t>directive</a:t>
+            </a:r>
+            <a:r>
+              <a:rPr lang="es-ES" b="1" dirty="0">
+                <a:solidFill>
+                  <a:srgbClr val="000080"/>
+                </a:solidFill>
+                <a:highlight>
+                  <a:srgbClr val="FFFFFF"/>
+                </a:highlight>
+              </a:rPr>
+              <a:t>(</a:t>
+            </a:r>
+            <a:r>
+              <a:rPr lang="es-ES" dirty="0">
+                <a:solidFill>
+                  <a:srgbClr val="808080"/>
+                </a:solidFill>
+                <a:highlight>
+                  <a:srgbClr val="FFFFFF"/>
+                </a:highlight>
+              </a:rPr>
+              <a:t>"</a:t>
+            </a:r>
+            <a:r>
+              <a:rPr lang="es-ES" dirty="0" err="1">
+                <a:solidFill>
+                  <a:srgbClr val="808080"/>
+                </a:solidFill>
+                <a:highlight>
+                  <a:srgbClr val="FFFFFF"/>
+                </a:highlight>
+              </a:rPr>
+              <a:t>superDirectiva</a:t>
+            </a:r>
+            <a:r>
+              <a:rPr lang="es-ES" dirty="0">
+                <a:solidFill>
+                  <a:srgbClr val="808080"/>
+                </a:solidFill>
+                <a:highlight>
+                  <a:srgbClr val="FFFFFF"/>
+                </a:highlight>
+              </a:rPr>
+              <a:t>"</a:t>
+            </a:r>
+            <a:r>
+              <a:rPr lang="es-ES" b="1" dirty="0">
+                <a:solidFill>
+                  <a:srgbClr val="000080"/>
+                </a:solidFill>
+                <a:highlight>
+                  <a:srgbClr val="FFFFFF"/>
+                </a:highlight>
+              </a:rPr>
+              <a:t>,</a:t>
+            </a:r>
+            <a:r>
+              <a:rPr lang="es-ES" dirty="0">
+                <a:solidFill>
+                  <a:srgbClr val="000000"/>
+                </a:solidFill>
+                <a:highlight>
+                  <a:srgbClr val="FFFFFF"/>
+                </a:highlight>
+              </a:rPr>
+              <a:t> </a:t>
+            </a:r>
+            <a:r>
+              <a:rPr lang="es-ES" b="1" dirty="0" err="1">
+                <a:solidFill>
+                  <a:srgbClr val="0000FF"/>
+                </a:solidFill>
+                <a:highlight>
+                  <a:srgbClr val="FFFFFF"/>
+                </a:highlight>
+              </a:rPr>
+              <a:t>function</a:t>
+            </a:r>
+            <a:r>
+              <a:rPr lang="es-ES" b="1" dirty="0">
+                <a:solidFill>
+                  <a:srgbClr val="000080"/>
+                </a:solidFill>
+                <a:highlight>
+                  <a:srgbClr val="FFFFFF"/>
+                </a:highlight>
+              </a:rPr>
+              <a:t>()</a:t>
+            </a:r>
+            <a:r>
+              <a:rPr lang="es-ES" dirty="0">
+                <a:solidFill>
+                  <a:srgbClr val="000000"/>
+                </a:solidFill>
+                <a:highlight>
+                  <a:srgbClr val="FFFFFF"/>
+                </a:highlight>
+              </a:rPr>
+              <a:t> </a:t>
+            </a:r>
+            <a:r>
+              <a:rPr lang="es-ES" b="1" dirty="0">
+                <a:solidFill>
+                  <a:srgbClr val="000080"/>
+                </a:solidFill>
+                <a:highlight>
+                  <a:srgbClr val="FFFFFF"/>
+                </a:highlight>
+              </a:rPr>
+              <a:t>{</a:t>
+            </a:r>
+            <a:endParaRPr lang="es-ES" dirty="0">
+              <a:solidFill>
+                <a:srgbClr val="000000"/>
+              </a:solidFill>
+              <a:highlight>
+                <a:srgbClr val="FFFFFF"/>
+              </a:highlight>
+            </a:endParaRPr>
+          </a:p>
+          <a:p>
+            <a:r>
+              <a:rPr lang="es-ES" dirty="0">
+                <a:solidFill>
+                  <a:srgbClr val="000000"/>
+                </a:solidFill>
+                <a:highlight>
+                  <a:srgbClr val="FFFFFF"/>
+                </a:highlight>
+              </a:rPr>
+              <a:t>	</a:t>
+            </a:r>
+            <a:r>
+              <a:rPr lang="es-ES" b="1" dirty="0" err="1">
+                <a:solidFill>
+                  <a:srgbClr val="0000FF"/>
+                </a:solidFill>
+                <a:highlight>
+                  <a:srgbClr val="FFFFFF"/>
+                </a:highlight>
+              </a:rPr>
+              <a:t>return</a:t>
+            </a:r>
+            <a:r>
+              <a:rPr lang="es-ES" dirty="0">
+                <a:solidFill>
+                  <a:srgbClr val="000000"/>
+                </a:solidFill>
+                <a:highlight>
+                  <a:srgbClr val="FFFFFF"/>
+                </a:highlight>
+              </a:rPr>
+              <a:t> </a:t>
+            </a:r>
+            <a:r>
+              <a:rPr lang="es-ES" b="1" dirty="0">
+                <a:solidFill>
+                  <a:srgbClr val="000080"/>
+                </a:solidFill>
+                <a:highlight>
+                  <a:srgbClr val="FFFFFF"/>
+                </a:highlight>
+              </a:rPr>
+              <a:t>{</a:t>
+            </a:r>
+            <a:endParaRPr lang="es-ES" dirty="0">
+              <a:solidFill>
+                <a:srgbClr val="000000"/>
+              </a:solidFill>
+              <a:highlight>
+                <a:srgbClr val="FFFFFF"/>
+              </a:highlight>
+            </a:endParaRPr>
+          </a:p>
+          <a:p>
+            <a:r>
+              <a:rPr lang="es-ES" dirty="0">
+                <a:solidFill>
+                  <a:srgbClr val="000000"/>
+                </a:solidFill>
+                <a:highlight>
+                  <a:srgbClr val="FFFFFF"/>
+                </a:highlight>
+              </a:rPr>
+              <a:t>		</a:t>
+            </a:r>
+            <a:r>
+              <a:rPr lang="es-ES" dirty="0" err="1">
+                <a:solidFill>
+                  <a:srgbClr val="000000"/>
+                </a:solidFill>
+                <a:highlight>
+                  <a:srgbClr val="FFFFFF"/>
+                </a:highlight>
+              </a:rPr>
+              <a:t>restrict</a:t>
+            </a:r>
+            <a:r>
+              <a:rPr lang="es-ES" b="1" dirty="0">
+                <a:solidFill>
+                  <a:srgbClr val="000080"/>
+                </a:solidFill>
+                <a:highlight>
+                  <a:srgbClr val="FFFFFF"/>
+                </a:highlight>
+              </a:rPr>
+              <a:t>:</a:t>
+            </a:r>
+            <a:r>
+              <a:rPr lang="es-ES" dirty="0">
+                <a:solidFill>
+                  <a:srgbClr val="000000"/>
+                </a:solidFill>
+                <a:highlight>
+                  <a:srgbClr val="FFFFFF"/>
+                </a:highlight>
+              </a:rPr>
+              <a:t> </a:t>
+            </a:r>
+            <a:r>
+              <a:rPr lang="es-ES" dirty="0">
+                <a:solidFill>
+                  <a:srgbClr val="808080"/>
+                </a:solidFill>
+                <a:highlight>
+                  <a:srgbClr val="FFFFFF"/>
+                </a:highlight>
+              </a:rPr>
+              <a:t>'AE'</a:t>
+            </a:r>
+            <a:r>
+              <a:rPr lang="es-ES" b="1" dirty="0">
+                <a:solidFill>
+                  <a:srgbClr val="000080"/>
+                </a:solidFill>
+                <a:highlight>
+                  <a:srgbClr val="FFFFFF"/>
+                </a:highlight>
+              </a:rPr>
+              <a:t>,</a:t>
+            </a:r>
+            <a:endParaRPr lang="es-ES" dirty="0">
+              <a:solidFill>
+                <a:srgbClr val="000000"/>
+              </a:solidFill>
+              <a:highlight>
+                <a:srgbClr val="FFFFFF"/>
+              </a:highlight>
+            </a:endParaRPr>
+          </a:p>
+          <a:p>
+            <a:r>
+              <a:rPr lang="es-ES" dirty="0">
+                <a:solidFill>
+                  <a:srgbClr val="000000"/>
+                </a:solidFill>
+                <a:highlight>
+                  <a:srgbClr val="FFFFFF"/>
+                </a:highlight>
+              </a:rPr>
+              <a:t>		</a:t>
+            </a:r>
+            <a:r>
+              <a:rPr lang="es-ES" dirty="0" err="1">
+                <a:solidFill>
+                  <a:srgbClr val="000000"/>
+                </a:solidFill>
+                <a:highlight>
+                  <a:srgbClr val="FFFFFF"/>
+                </a:highlight>
+              </a:rPr>
+              <a:t>templateUrl</a:t>
+            </a:r>
+            <a:r>
+              <a:rPr lang="es-ES" b="1" dirty="0">
+                <a:solidFill>
+                  <a:srgbClr val="000080"/>
+                </a:solidFill>
+                <a:highlight>
+                  <a:srgbClr val="FFFFFF"/>
+                </a:highlight>
+              </a:rPr>
+              <a:t>:</a:t>
+            </a:r>
+            <a:r>
+              <a:rPr lang="es-ES" dirty="0">
+                <a:solidFill>
+                  <a:srgbClr val="000000"/>
+                </a:solidFill>
+                <a:highlight>
+                  <a:srgbClr val="FFFFFF"/>
+                </a:highlight>
+              </a:rPr>
+              <a:t> </a:t>
+            </a:r>
+            <a:r>
+              <a:rPr lang="es-ES" dirty="0">
+                <a:solidFill>
+                  <a:srgbClr val="808080"/>
+                </a:solidFill>
+                <a:highlight>
+                  <a:srgbClr val="FFFFFF"/>
+                </a:highlight>
+              </a:rPr>
+              <a:t>'</a:t>
+            </a:r>
+            <a:r>
+              <a:rPr lang="es-ES" dirty="0" err="1">
+                <a:solidFill>
+                  <a:srgbClr val="808080"/>
+                </a:solidFill>
+                <a:highlight>
+                  <a:srgbClr val="FFFFFF"/>
+                </a:highlight>
+              </a:rPr>
+              <a:t>views</a:t>
+            </a:r>
+            <a:r>
+              <a:rPr lang="es-ES" dirty="0">
+                <a:solidFill>
+                  <a:srgbClr val="808080"/>
+                </a:solidFill>
+                <a:highlight>
+                  <a:srgbClr val="FFFFFF"/>
+                </a:highlight>
+              </a:rPr>
+              <a:t>/principal.html'</a:t>
+            </a:r>
+            <a:r>
+              <a:rPr lang="es-ES" b="1" dirty="0">
+                <a:solidFill>
+                  <a:srgbClr val="000080"/>
+                </a:solidFill>
+                <a:highlight>
+                  <a:srgbClr val="FFFFFF"/>
+                </a:highlight>
+              </a:rPr>
+              <a:t>,</a:t>
+            </a:r>
+            <a:endParaRPr lang="es-ES" dirty="0">
+              <a:solidFill>
+                <a:srgbClr val="000000"/>
+              </a:solidFill>
+              <a:highlight>
+                <a:srgbClr val="FFFFFF"/>
+              </a:highlight>
+            </a:endParaRPr>
+          </a:p>
+          <a:p>
+            <a:r>
+              <a:rPr lang="es-ES" dirty="0">
+                <a:solidFill>
+                  <a:srgbClr val="000000"/>
+                </a:solidFill>
+                <a:highlight>
+                  <a:srgbClr val="FFFFFF"/>
+                </a:highlight>
+              </a:rPr>
+              <a:t>		</a:t>
+            </a:r>
+            <a:r>
+              <a:rPr lang="es-ES" dirty="0" err="1">
+                <a:solidFill>
+                  <a:srgbClr val="000000"/>
+                </a:solidFill>
+                <a:highlight>
+                  <a:srgbClr val="FFFFFF"/>
+                </a:highlight>
+              </a:rPr>
+              <a:t>scope</a:t>
+            </a:r>
+            <a:r>
+              <a:rPr lang="es-ES" b="1" dirty="0">
+                <a:solidFill>
+                  <a:srgbClr val="000080"/>
+                </a:solidFill>
+                <a:highlight>
+                  <a:srgbClr val="FFFFFF"/>
+                </a:highlight>
+              </a:rPr>
+              <a:t>:</a:t>
+            </a:r>
+            <a:r>
+              <a:rPr lang="es-ES" dirty="0">
+                <a:solidFill>
+                  <a:srgbClr val="000000"/>
+                </a:solidFill>
+                <a:highlight>
+                  <a:srgbClr val="FFFFFF"/>
+                </a:highlight>
+              </a:rPr>
+              <a:t> </a:t>
+            </a:r>
+            <a:r>
+              <a:rPr lang="es-ES" b="1" dirty="0">
+                <a:solidFill>
+                  <a:srgbClr val="0000FF"/>
+                </a:solidFill>
+                <a:highlight>
+                  <a:srgbClr val="FFFFFF"/>
+                </a:highlight>
+              </a:rPr>
+              <a:t>true</a:t>
+            </a:r>
+            <a:endParaRPr lang="es-ES" dirty="0">
+              <a:solidFill>
+                <a:srgbClr val="000000"/>
+              </a:solidFill>
+              <a:highlight>
+                <a:srgbClr val="FFFFFF"/>
+              </a:highlight>
+            </a:endParaRPr>
+          </a:p>
+          <a:p>
+            <a:r>
+              <a:rPr lang="es-ES" dirty="0">
+                <a:solidFill>
+                  <a:srgbClr val="000000"/>
+                </a:solidFill>
+                <a:highlight>
+                  <a:srgbClr val="FFFFFF"/>
+                </a:highlight>
+              </a:rPr>
+              <a:t>	</a:t>
+            </a:r>
+            <a:r>
+              <a:rPr lang="es-ES" b="1" dirty="0">
+                <a:solidFill>
+                  <a:srgbClr val="000080"/>
+                </a:solidFill>
+                <a:highlight>
+                  <a:srgbClr val="FFFFFF"/>
+                </a:highlight>
+              </a:rPr>
+              <a:t>}</a:t>
+            </a:r>
+            <a:endParaRPr lang="es-ES" dirty="0">
+              <a:solidFill>
+                <a:srgbClr val="000000"/>
+              </a:solidFill>
+              <a:highlight>
+                <a:srgbClr val="FFFFFF"/>
+              </a:highlight>
+            </a:endParaRPr>
+          </a:p>
+          <a:p>
+            <a:r>
+              <a:rPr lang="es-ES" b="1" dirty="0">
+                <a:solidFill>
+                  <a:srgbClr val="000080"/>
+                </a:solidFill>
+                <a:highlight>
+                  <a:srgbClr val="FFFFFF"/>
+                </a:highlight>
+              </a:rPr>
+              <a:t>});</a:t>
+            </a:r>
+            <a:endParaRPr lang="es-ES" dirty="0"/>
+          </a:p>
+        </p:txBody>
+      </p:sp>
+      <p:sp>
+        <p:nvSpPr>
+          <p:cNvPr id="5" name="Rectángulo 4"/>
+          <p:cNvSpPr/>
+          <p:nvPr/>
+        </p:nvSpPr>
+        <p:spPr>
+          <a:xfrm>
+            <a:off x="1017916" y="3184793"/>
+            <a:ext cx="7497433" cy="923330"/>
+          </a:xfrm>
+          <a:prstGeom prst="rect">
+            <a:avLst/>
+          </a:prstGeom>
+          <a:ln>
+            <a:solidFill>
+              <a:schemeClr val="accent6"/>
+            </a:solidFill>
+          </a:ln>
+        </p:spPr>
+        <p:txBody>
+          <a:bodyPr wrap="square">
+            <a:spAutoFit/>
+          </a:bodyPr>
+          <a:lstStyle/>
+          <a:p>
+            <a:r>
+              <a:rPr lang="es-ES" dirty="0">
+                <a:solidFill>
+                  <a:srgbClr val="0000FF"/>
+                </a:solidFill>
+                <a:highlight>
+                  <a:srgbClr val="FFFFFF"/>
+                </a:highlight>
+              </a:rPr>
+              <a:t>&lt;</a:t>
+            </a:r>
+            <a:r>
+              <a:rPr lang="es-ES" dirty="0" err="1">
+                <a:solidFill>
+                  <a:srgbClr val="0000FF"/>
+                </a:solidFill>
+                <a:highlight>
+                  <a:srgbClr val="FFFFFF"/>
+                </a:highlight>
+              </a:rPr>
+              <a:t>body</a:t>
+            </a:r>
+            <a:r>
+              <a:rPr lang="es-ES" dirty="0">
+                <a:solidFill>
+                  <a:srgbClr val="0000FF"/>
+                </a:solidFill>
+                <a:highlight>
+                  <a:srgbClr val="FFFFFF"/>
+                </a:highlight>
+              </a:rPr>
+              <a:t>&gt;</a:t>
+            </a:r>
+            <a:endParaRPr lang="es-ES" b="1" dirty="0">
+              <a:solidFill>
+                <a:srgbClr val="000000"/>
+              </a:solidFill>
+              <a:highlight>
+                <a:srgbClr val="FFFFFF"/>
+              </a:highlight>
+            </a:endParaRPr>
+          </a:p>
+          <a:p>
+            <a:r>
+              <a:rPr lang="es-ES" b="1" dirty="0">
+                <a:solidFill>
+                  <a:srgbClr val="000000"/>
+                </a:solidFill>
+                <a:highlight>
+                  <a:srgbClr val="FFFFFF"/>
+                </a:highlight>
+              </a:rPr>
+              <a:t>	</a:t>
+            </a:r>
+            <a:r>
+              <a:rPr lang="es-ES" dirty="0">
+                <a:solidFill>
+                  <a:srgbClr val="000000"/>
+                </a:solidFill>
+                <a:highlight>
+                  <a:srgbClr val="FFFFFF"/>
+                </a:highlight>
+              </a:rPr>
+              <a:t>&lt;</a:t>
+            </a:r>
+            <a:r>
+              <a:rPr lang="es-ES" dirty="0" err="1">
+                <a:solidFill>
+                  <a:srgbClr val="000000"/>
+                </a:solidFill>
+                <a:highlight>
+                  <a:srgbClr val="FFFFFF"/>
+                </a:highlight>
+              </a:rPr>
+              <a:t>super</a:t>
+            </a:r>
+            <a:r>
+              <a:rPr lang="es-ES" dirty="0">
+                <a:solidFill>
+                  <a:srgbClr val="000000"/>
+                </a:solidFill>
+                <a:highlight>
+                  <a:srgbClr val="FFFFFF"/>
+                </a:highlight>
+              </a:rPr>
+              <a:t>-directiva&gt;&lt;/</a:t>
+            </a:r>
+            <a:r>
+              <a:rPr lang="es-ES" dirty="0" err="1">
+                <a:solidFill>
+                  <a:srgbClr val="000000"/>
+                </a:solidFill>
+                <a:highlight>
+                  <a:srgbClr val="FFFFFF"/>
+                </a:highlight>
+              </a:rPr>
+              <a:t>super</a:t>
+            </a:r>
+            <a:r>
+              <a:rPr lang="es-ES" dirty="0">
+                <a:solidFill>
+                  <a:srgbClr val="000000"/>
+                </a:solidFill>
+                <a:highlight>
+                  <a:srgbClr val="FFFFFF"/>
+                </a:highlight>
+              </a:rPr>
+              <a:t>-directiva&gt;</a:t>
+            </a:r>
+            <a:endParaRPr lang="es-ES" b="1" dirty="0">
+              <a:solidFill>
+                <a:srgbClr val="000000"/>
+              </a:solidFill>
+              <a:highlight>
+                <a:srgbClr val="FFFFFF"/>
+              </a:highlight>
+            </a:endParaRPr>
+          </a:p>
+          <a:p>
+            <a:r>
+              <a:rPr lang="es-ES" dirty="0">
+                <a:solidFill>
+                  <a:srgbClr val="0000FF"/>
+                </a:solidFill>
+                <a:highlight>
+                  <a:srgbClr val="FFFFFF"/>
+                </a:highlight>
+              </a:rPr>
+              <a:t>&lt;/</a:t>
+            </a:r>
+            <a:r>
+              <a:rPr lang="es-ES" dirty="0" err="1">
+                <a:solidFill>
+                  <a:srgbClr val="0000FF"/>
+                </a:solidFill>
+                <a:highlight>
+                  <a:srgbClr val="FFFFFF"/>
+                </a:highlight>
+              </a:rPr>
+              <a:t>body</a:t>
+            </a:r>
+            <a:r>
+              <a:rPr lang="es-ES" dirty="0">
+                <a:solidFill>
+                  <a:srgbClr val="0000FF"/>
+                </a:solidFill>
+                <a:highlight>
+                  <a:srgbClr val="FFFFFF"/>
+                </a:highlight>
+              </a:rPr>
+              <a:t>&gt;</a:t>
+            </a:r>
+            <a:endParaRPr lang="es-ES" dirty="0"/>
+          </a:p>
+        </p:txBody>
+      </p:sp>
+    </p:spTree>
+    <p:extLst>
+      <p:ext uri="{BB962C8B-B14F-4D97-AF65-F5344CB8AC3E}">
+        <p14:creationId xmlns:p14="http://schemas.microsoft.com/office/powerpoint/2010/main" val="523687906"/>
+      </p:ext>
+    </p:extLst>
+  </p:cSld>
+  <p:clrMapOvr>
+    <a:masterClrMapping/>
+  </p:clrMapOvr>
+  <p:timing>
+    <p:tnLst>
+      <p:par>
+        <p:cTn id="1" dur="indefinite" restart="never" nodeType="tmRoot"/>
+      </p:par>
+    </p:tnLst>
+  </p:timing>
+</p:sld>
+</file>
+
+<file path=ppt/slides/slide61.xml><?xml version="1.0" encoding="utf-8"?>
+<p:sld xmlns:a="http://schemas.openxmlformats.org/drawingml/2006/main" xmlns:r="http://schemas.openxmlformats.org/officeDocument/2006/relationships" xmlns:p="http://schemas.openxmlformats.org/presentationml/2006/main">
+  <p:cSld>
+    <p:spTree>
+      <p:nvGrpSpPr>
+        <p:cNvPr id="1" name=""/>
+        <p:cNvGrpSpPr/>
+        <p:nvPr/>
+      </p:nvGrpSpPr>
+      <p:grpSpPr>
+        <a:xfrm>
+          <a:off x="0" y="0"/>
+          <a:ext cx="0" cy="0"/>
+          <a:chOff x="0" y="0"/>
+          <a:chExt cx="0" cy="0"/>
+        </a:xfrm>
+      </p:grpSpPr>
+      <p:sp>
+        <p:nvSpPr>
+          <p:cNvPr id="4" name="Título 3"/>
+          <p:cNvSpPr>
+            <a:spLocks noGrp="1"/>
+          </p:cNvSpPr>
+          <p:nvPr>
+            <p:ph type="title"/>
+          </p:nvPr>
+        </p:nvSpPr>
+        <p:spPr>
+          <a:xfrm>
+            <a:off x="628650" y="365126"/>
+            <a:ext cx="7886700" cy="695923"/>
+          </a:xfrm>
+        </p:spPr>
+        <p:txBody>
+          <a:bodyPr/>
+          <a:lstStyle/>
+          <a:p>
+            <a:r>
+              <a:rPr lang="es-ES" dirty="0" smtClean="0"/>
+              <a:t>Taller</a:t>
+            </a:r>
+            <a:endParaRPr lang="es-ES" dirty="0"/>
+          </a:p>
+        </p:txBody>
+      </p:sp>
+      <p:sp>
+        <p:nvSpPr>
+          <p:cNvPr id="6" name="Rectángulo 5"/>
+          <p:cNvSpPr/>
+          <p:nvPr/>
+        </p:nvSpPr>
+        <p:spPr>
+          <a:xfrm rot="5400000">
+            <a:off x="4418881" y="1812986"/>
+            <a:ext cx="306238" cy="9144000"/>
+          </a:xfrm>
+          <a:prstGeom prst="rect">
+            <a:avLst/>
+          </a:prstGeom>
+          <a:solidFill>
+            <a:schemeClr val="accent4">
+              <a:lumMod val="40000"/>
+              <a:lumOff val="60000"/>
+            </a:schemeClr>
+          </a:solidFill>
+          <a:ln w="28575">
+            <a:solidFill>
+              <a:schemeClr val="accent6">
+                <a:lumMod val="40000"/>
+                <a:lumOff val="60000"/>
+              </a:schemeClr>
+            </a:solidFill>
+          </a:ln>
+        </p:spPr>
+        <p:style>
+          <a:lnRef idx="2">
+            <a:schemeClr val="accent1">
+              <a:shade val="50000"/>
+            </a:schemeClr>
+          </a:lnRef>
+          <a:fillRef idx="1">
+            <a:schemeClr val="accent1"/>
+          </a:fillRef>
+          <a:effectRef idx="0">
+            <a:schemeClr val="accent1"/>
+          </a:effectRef>
+          <a:fontRef idx="minor">
+            <a:schemeClr val="lt1"/>
+          </a:fontRef>
+        </p:style>
+        <p:txBody>
+          <a:bodyPr rtlCol="0" anchor="ctr"/>
+          <a:lstStyle/>
+          <a:p>
+            <a:pPr algn="ctr"/>
+            <a:endParaRPr lang="es-ES"/>
+          </a:p>
+        </p:txBody>
+      </p:sp>
+      <p:pic>
+        <p:nvPicPr>
+          <p:cNvPr id="7" name="Picture 2" descr="http://www.dennysteens.com/wp-content/uploads/2015/11/Banye.png"/>
+          <p:cNvPicPr>
+            <a:picLocks noChangeAspect="1" noChangeArrowheads="1"/>
+          </p:cNvPicPr>
+          <p:nvPr/>
+        </p:nvPicPr>
+        <p:blipFill>
+          <a:blip r:embed="rId2">
+            <a:extLst>
+              <a:ext uri="{28A0092B-C50C-407E-A947-70E740481C1C}">
+                <a14:useLocalDpi xmlns:a14="http://schemas.microsoft.com/office/drawing/2010/main" val="0"/>
+              </a:ext>
+            </a:extLst>
+          </a:blip>
+          <a:srcRect/>
+          <a:stretch>
+            <a:fillRect/>
+          </a:stretch>
+        </p:blipFill>
+        <p:spPr bwMode="auto">
+          <a:xfrm>
+            <a:off x="1000662" y="1061049"/>
+            <a:ext cx="7411169" cy="4940780"/>
+          </a:xfrm>
+          <a:prstGeom prst="rect">
+            <a:avLst/>
+          </a:prstGeom>
+          <a:noFill/>
+          <a:extLst>
+            <a:ext uri="{909E8E84-426E-40DD-AFC4-6F175D3DCCD1}">
+              <a14:hiddenFill xmlns:a14="http://schemas.microsoft.com/office/drawing/2010/main">
+                <a:solidFill>
+                  <a:srgbClr val="FFFFFF"/>
+                </a:solidFill>
+              </a14:hiddenFill>
+            </a:ext>
+          </a:extLst>
+        </p:spPr>
+      </p:pic>
+    </p:spTree>
+    <p:extLst>
+      <p:ext uri="{BB962C8B-B14F-4D97-AF65-F5344CB8AC3E}">
+        <p14:creationId xmlns:p14="http://schemas.microsoft.com/office/powerpoint/2010/main" val="2089661724"/>
       </p:ext>
     </p:extLst>
   </p:cSld>

</xml_diff>

<commit_message>
Logo de GumUS added
</commit_message>
<xml_diff>
--- a/documentacion/Taller de AngularJS.pptx
+++ b/documentacion/Taller de AngularJS.pptx
@@ -3218,6 +3218,88 @@
           </a:p>
         </p:txBody>
       </p:sp>
+      <p:pic>
+        <p:nvPicPr>
+          <p:cNvPr id="2050" name="Picture 2" descr="https://pbs.twimg.com/profile_images/522766032683814912/5BGl_GQX_400x400.jpeg"/>
+          <p:cNvPicPr>
+            <a:picLocks noChangeAspect="1" noChangeArrowheads="1"/>
+          </p:cNvPicPr>
+          <p:nvPr/>
+        </p:nvPicPr>
+        <p:blipFill>
+          <a:blip r:embed="rId2">
+            <a:extLst>
+              <a:ext uri="{28A0092B-C50C-407E-A947-70E740481C1C}">
+                <a14:useLocalDpi xmlns:a14="http://schemas.microsoft.com/office/drawing/2010/main" val="0"/>
+              </a:ext>
+            </a:extLst>
+          </a:blip>
+          <a:srcRect/>
+          <a:stretch>
+            <a:fillRect/>
+          </a:stretch>
+        </p:blipFill>
+        <p:spPr bwMode="auto">
+          <a:xfrm>
+            <a:off x="6590880" y="3747041"/>
+            <a:ext cx="2216689" cy="2216689"/>
+          </a:xfrm>
+          <a:prstGeom prst="rect">
+            <a:avLst/>
+          </a:prstGeom>
+          <a:noFill/>
+          <a:extLst>
+            <a:ext uri="{909E8E84-426E-40DD-AFC4-6F175D3DCCD1}">
+              <a14:hiddenFill xmlns:a14="http://schemas.microsoft.com/office/drawing/2010/main">
+                <a:solidFill>
+                  <a:srgbClr val="FFFFFF"/>
+                </a:solidFill>
+              </a14:hiddenFill>
+            </a:ext>
+          </a:extLst>
+        </p:spPr>
+      </p:pic>
+      <p:pic>
+        <p:nvPicPr>
+          <p:cNvPr id="10" name="Picture 10" descr="Resultado de imagen de angularjs logo png"/>
+          <p:cNvPicPr>
+            <a:picLocks noChangeAspect="1" noChangeArrowheads="1"/>
+          </p:cNvPicPr>
+          <p:nvPr/>
+        </p:nvPicPr>
+        <p:blipFill>
+          <a:blip r:embed="rId3" cstate="print">
+            <a:extLst>
+              <a:ext uri="{28A0092B-C50C-407E-A947-70E740481C1C}">
+                <a14:useLocalDpi xmlns:a14="http://schemas.microsoft.com/office/drawing/2010/main" val="0"/>
+              </a:ext>
+            </a:extLst>
+          </a:blip>
+          <a:srcRect/>
+          <a:stretch>
+            <a:fillRect/>
+          </a:stretch>
+        </p:blipFill>
+        <p:spPr bwMode="auto">
+          <a:xfrm>
+            <a:off x="1065362" y="4509909"/>
+            <a:ext cx="3811889" cy="1014676"/>
+          </a:xfrm>
+          <a:prstGeom prst="rect">
+            <a:avLst/>
+          </a:prstGeom>
+          <a:noFill/>
+          <a:extLst>
+            <a:ext uri="{909E8E84-426E-40DD-AFC4-6F175D3DCCD1}">
+              <a14:hiddenFill xmlns:a14="http://schemas.microsoft.com/office/drawing/2010/main">
+                <a:solidFill>
+                  <a:srgbClr val="FFFFFF"/>
+                </a:solidFill>
+              </a14:hiddenFill>
+            </a:ext>
+          </a:extLst>
+        </p:spPr>
+      </p:pic>
     </p:spTree>
     <p:extLst>
       <p:ext uri="{BB962C8B-B14F-4D97-AF65-F5344CB8AC3E}">
@@ -10010,9 +10092,20 @@
             <a:p>
               <a:r>
                 <a:rPr lang="es-ES" sz="2800" dirty="0" smtClean="0"/>
-                <a:t>https://github.com/MarcosGinel</a:t>
+                <a:t>https://</a:t>
+              </a:r>
+              <a:r>
+                <a:rPr lang="es-ES" sz="2800" dirty="0" smtClean="0"/>
+                <a:t>github.com/MarcosGinel</a:t>
               </a:r>
               <a:endParaRPr lang="es-ES" sz="2800" dirty="0"/>
+            </a:p>
+            <a:p>
+              <a:r>
+                <a:rPr lang="es-ES" sz="2800" dirty="0" err="1" smtClean="0"/>
+                <a:t>GumUS</a:t>
+              </a:r>
+              <a:endParaRPr lang="es-ES" sz="2800" dirty="0" smtClean="0"/>
             </a:p>
           </p:txBody>
         </p:sp>
@@ -10131,6 +10224,47 @@
           <a:xfrm>
             <a:off x="3342724" y="3941025"/>
             <a:ext cx="581485" cy="483360"/>
+          </a:xfrm>
+          <a:prstGeom prst="rect">
+            <a:avLst/>
+          </a:prstGeom>
+          <a:noFill/>
+          <a:extLst>
+            <a:ext uri="{909E8E84-426E-40DD-AFC4-6F175D3DCCD1}">
+              <a14:hiddenFill xmlns:a14="http://schemas.microsoft.com/office/drawing/2010/main">
+                <a:solidFill>
+                  <a:srgbClr val="FFFFFF"/>
+                </a:solidFill>
+              </a14:hiddenFill>
+            </a:ext>
+          </a:extLst>
+        </p:spPr>
+      </p:pic>
+      <p:pic>
+        <p:nvPicPr>
+          <p:cNvPr id="2" name="Picture 2" descr="https://pbs.twimg.com/profile_images/522766032683814912/5BGl_GQX_400x400.jpeg"/>
+          <p:cNvPicPr>
+            <a:picLocks noChangeAspect="1" noChangeArrowheads="1"/>
+          </p:cNvPicPr>
+          <p:nvPr/>
+        </p:nvPicPr>
+        <p:blipFill>
+          <a:blip r:embed="rId7" cstate="print">
+            <a:extLst>
+              <a:ext uri="{28A0092B-C50C-407E-A947-70E740481C1C}">
+                <a14:useLocalDpi xmlns:a14="http://schemas.microsoft.com/office/drawing/2010/main" val="0"/>
+              </a:ext>
+            </a:extLst>
+          </a:blip>
+          <a:srcRect/>
+          <a:stretch>
+            <a:fillRect/>
+          </a:stretch>
+        </p:blipFill>
+        <p:spPr bwMode="auto">
+          <a:xfrm>
+            <a:off x="3406648" y="4422911"/>
+            <a:ext cx="434794" cy="434794"/>
           </a:xfrm>
           <a:prstGeom prst="rect">
             <a:avLst/>

</xml_diff>